<commit_message>
change the week3.cpp file
</commit_message>
<xml_diff>
--- a/Exercies/Exercise02.pptx
+++ b/Exercies/Exercise02.pptx
@@ -770,7 +770,7 @@
             <a:fld id="{530820CF-B880-4189-942D-D702A7CBA730}" type="datetimeFigureOut">
               <a:rPr lang="zh-CHS" altLang="en-US" smtClean="0"/>
               <a:pPr/>
-              <a:t>15/3/16</a:t>
+              <a:t>15/3/18</a:t>
             </a:fld>
             <a:endParaRPr lang="zh-CHS" altLang="en-US"/>
           </a:p>
@@ -968,7 +968,7 @@
             <a:fld id="{530820CF-B880-4189-942D-D702A7CBA730}" type="datetimeFigureOut">
               <a:rPr lang="zh-CHS" altLang="en-US" smtClean="0"/>
               <a:pPr/>
-              <a:t>15/3/16</a:t>
+              <a:t>15/3/18</a:t>
             </a:fld>
             <a:endParaRPr lang="zh-CHS" altLang="en-US"/>
           </a:p>
@@ -1155,7 +1155,7 @@
             <a:fld id="{530820CF-B880-4189-942D-D702A7CBA730}" type="datetimeFigureOut">
               <a:rPr lang="zh-CHS" altLang="en-US" smtClean="0"/>
               <a:pPr/>
-              <a:t>15/3/16</a:t>
+              <a:t>15/3/18</a:t>
             </a:fld>
             <a:endParaRPr lang="zh-CHS" altLang="en-US"/>
           </a:p>
@@ -1307,7 +1307,7 @@
             <a:fld id="{530820CF-B880-4189-942D-D702A7CBA730}" type="datetimeFigureOut">
               <a:rPr lang="zh-CHS" altLang="en-US" smtClean="0"/>
               <a:pPr/>
-              <a:t>15/3/16</a:t>
+              <a:t>15/3/18</a:t>
             </a:fld>
             <a:endParaRPr lang="zh-CHS" altLang="en-US"/>
           </a:p>
@@ -1559,7 +1559,7 @@
             <a:fld id="{530820CF-B880-4189-942D-D702A7CBA730}" type="datetimeFigureOut">
               <a:rPr lang="zh-CHS" altLang="en-US" smtClean="0"/>
               <a:pPr/>
-              <a:t>15/3/16</a:t>
+              <a:t>15/3/18</a:t>
             </a:fld>
             <a:endParaRPr lang="zh-CHS" altLang="en-US"/>
           </a:p>
@@ -1965,7 +1965,7 @@
             <a:fld id="{530820CF-B880-4189-942D-D702A7CBA730}" type="datetimeFigureOut">
               <a:rPr lang="zh-CHS" altLang="en-US" smtClean="0"/>
               <a:pPr/>
-              <a:t>15/3/16</a:t>
+              <a:t>15/3/18</a:t>
             </a:fld>
             <a:endParaRPr lang="zh-CHS" altLang="en-US"/>
           </a:p>
@@ -2408,7 +2408,7 @@
             <a:fld id="{530820CF-B880-4189-942D-D702A7CBA730}" type="datetimeFigureOut">
               <a:rPr lang="zh-CHS" altLang="en-US" smtClean="0"/>
               <a:pPr/>
-              <a:t>15/3/16</a:t>
+              <a:t>15/3/18</a:t>
             </a:fld>
             <a:endParaRPr lang="zh-CHS" altLang="en-US"/>
           </a:p>
@@ -2506,7 +2506,7 @@
             <a:fld id="{530820CF-B880-4189-942D-D702A7CBA730}" type="datetimeFigureOut">
               <a:rPr lang="zh-CHS" altLang="en-US" smtClean="0"/>
               <a:pPr/>
-              <a:t>15/3/16</a:t>
+              <a:t>15/3/18</a:t>
             </a:fld>
             <a:endParaRPr lang="zh-CHS" altLang="en-US"/>
           </a:p>
@@ -2629,7 +2629,7 @@
             <a:fld id="{530820CF-B880-4189-942D-D702A7CBA730}" type="datetimeFigureOut">
               <a:rPr lang="zh-CHS" altLang="en-US" smtClean="0"/>
               <a:pPr/>
-              <a:t>15/3/16</a:t>
+              <a:t>15/3/18</a:t>
             </a:fld>
             <a:endParaRPr lang="zh-CHS" altLang="en-US"/>
           </a:p>
@@ -2900,7 +2900,7 @@
             <a:fld id="{530820CF-B880-4189-942D-D702A7CBA730}" type="datetimeFigureOut">
               <a:rPr lang="zh-CHS" altLang="en-US" smtClean="0"/>
               <a:pPr/>
-              <a:t>15/3/16</a:t>
+              <a:t>15/3/18</a:t>
             </a:fld>
             <a:endParaRPr lang="zh-CHS" altLang="en-US"/>
           </a:p>
@@ -3102,7 +3102,7 @@
             <a:fld id="{530820CF-B880-4189-942D-D702A7CBA730}" type="datetimeFigureOut">
               <a:rPr lang="zh-CHS" altLang="en-US" smtClean="0"/>
               <a:pPr/>
-              <a:t>15/3/16</a:t>
+              <a:t>15/3/18</a:t>
             </a:fld>
             <a:endParaRPr lang="zh-CHS" altLang="en-US"/>
           </a:p>
@@ -4222,7 +4222,7 @@
             <a:fld id="{530820CF-B880-4189-942D-D702A7CBA730}" type="datetimeFigureOut">
               <a:rPr lang="zh-CHS" altLang="en-US" smtClean="0"/>
               <a:pPr/>
-              <a:t>15/3/16</a:t>
+              <a:t>15/3/18</a:t>
             </a:fld>
             <a:endParaRPr lang="zh-CHS" altLang="en-US"/>
           </a:p>
@@ -9843,7 +9843,7 @@
           <a:graphicData uri="http://schemas.openxmlformats.org/presentationml/2006/ole">
             <mc:AlternateContent xmlns:mc="http://schemas.openxmlformats.org/markup-compatibility/2006">
               <mc:Choice xmlns:v="urn:schemas-microsoft-com:vml" Requires="v">
-                <p:oleObj spid="_x0000_s1028" name="公式" r:id="rId3" imgW="647640" imgH="177480" progId="Equation.3">
+                <p:oleObj spid="_x0000_s1030" name="公式" r:id="rId3" imgW="647640" imgH="177480" progId="Equation.3">
                   <p:embed/>
                 </p:oleObj>
               </mc:Choice>

</xml_diff>